<commit_message>
Updating the content of presentation
</commit_message>
<xml_diff>
--- a/Presentation/Proj4_presentation.pptx
+++ b/Presentation/Proj4_presentation.pptx
@@ -1,9 +1,12 @@
 
 <file path=ppt/presentation.xml><?xml version="1.0" encoding="utf-8"?>
-<p:presentation xmlns:a="http://schemas.openxmlformats.org/drawingml/2006/main" xmlns:r="http://schemas.openxmlformats.org/officeDocument/2006/relationships" xmlns:p="http://schemas.openxmlformats.org/presentationml/2006/main" saveSubsetFonts="1" autoCompressPictures="0">
+<p:presentation xmlns:a="http://schemas.openxmlformats.org/drawingml/2006/main" xmlns:r="http://schemas.openxmlformats.org/officeDocument/2006/relationships" xmlns:p="http://schemas.openxmlformats.org/presentationml/2006/main" showSpecialPlsOnTitleSld="0" saveSubsetFonts="1" autoCompressPictures="0">
   <p:sldMasterIdLst>
     <p:sldMasterId id="2147483648" r:id="rId1"/>
   </p:sldMasterIdLst>
+  <p:notesMasterIdLst>
+    <p:notesMasterId r:id="rId16"/>
+  </p:notesMasterIdLst>
   <p:sldIdLst>
     <p:sldId id="256" r:id="rId2"/>
     <p:sldId id="257" r:id="rId3"/>
@@ -128,6 +131,7 @@
 <file path=ppt/authors.xml><?xml version="1.0" encoding="utf-8"?>
 <p188:authorLst xmlns:a="http://schemas.openxmlformats.org/drawingml/2006/main" xmlns:r="http://schemas.openxmlformats.org/officeDocument/2006/relationships" xmlns:p188="http://schemas.microsoft.com/office/powerpoint/2018/8/main">
   <p188:author id="{0EC2D70F-E384-9803-E3F1-EF16A3855103}" name="Oliver King" initials="OK" userId="2f8be3b40744adfd" providerId="Windows Live"/>
+  <p188:author id="{210206AB-430C-125E-3CF9-8271501E1E77}" name="Mohsen Farrokhrouz" initials="MF" userId="ad2061eca19da9a1" providerId="Windows Live"/>
 </p188:authorLst>
 </file>
 
@@ -200,6 +204,20 @@
       <pc:sldMk xmlns:pc="http://schemas.microsoft.com/office/powerpoint/2013/main/command" cId="4117987035" sldId="267"/>
       <ac:spMk id="3" creationId="{97817015-EDDD-71A7-5B9F-77642F1574A2}"/>
     </ac:deMkLst>
+    <p188:replyLst>
+      <p188:reply id="{AA1D0EC5-3D60-421A-AA63-E809B7E521BE}" authorId="{210206AB-430C-125E-3CF9-8271501E1E77}" created="2023-06-01T09:24:44.788">
+        <p188:txBody>
+          <a:bodyPr/>
+          <a:lstStyle/>
+          <a:p>
+            <a:r>
+              <a:rPr lang="en-AU"/>
+              <a:t>Rearranged and Resolved</a:t>
+            </a:r>
+          </a:p>
+        </p188:txBody>
+      </p188:reply>
+    </p188:replyLst>
     <p188:txBody>
       <a:bodyPr/>
       <a:lstStyle/>
@@ -3420,8 +3438,6 @@
     <dgm:cxn modelId="{6B76A52E-4B59-9841-A066-7BC4DED5E464}" srcId="{A62FF51C-C761-DC4D-8D4D-A4BEEEE1E40E}" destId="{2226237A-BBDD-F240-B636-696E5A3F73FA}" srcOrd="0" destOrd="0" parTransId="{166FD673-124C-1243-885C-0DCC45700B96}" sibTransId="{2F8C3794-C210-F342-97DD-16FAE25302CC}"/>
     <dgm:cxn modelId="{C9EC3C36-59A0-1B41-837F-8DA9C4297046}" type="presOf" srcId="{50AF8974-B3BB-2B40-8D42-BD4F702D6681}" destId="{81EB66CF-0842-4240-8CF1-4635DDB5DA37}" srcOrd="0" destOrd="0" presId="urn:microsoft.com/office/officeart/2005/8/layout/chevron2"/>
     <dgm:cxn modelId="{AE090E3A-494E-3440-B0E8-2741125156EB}" type="presOf" srcId="{F3AD1DA9-4C09-1740-8685-7F7C82914C75}" destId="{C8FB3212-F9BD-714B-91A2-0DFF71DAFF28}" srcOrd="0" destOrd="0" presId="urn:microsoft.com/office/officeart/2005/8/layout/chevron2"/>
-    <dgm:cxn modelId="{54A7BE53-1483-E04B-8795-D1F2BFC6B3ED}" type="presOf" srcId="{B7EAE4D8-817B-0546-A572-06E6D63807F1}" destId="{6EE28908-DD59-2847-929A-38C430F0B19F}" srcOrd="0" destOrd="0" presId="urn:microsoft.com/office/officeart/2005/8/layout/chevron2"/>
-    <dgm:cxn modelId="{E542E056-4172-6A4D-BD2F-4F3C53081B6F}" type="presOf" srcId="{19F60B9A-F6F3-3045-A587-B2B518082C4F}" destId="{E2E8E3C3-6FDF-9446-98CF-6A830EDBB04D}" srcOrd="0" destOrd="0" presId="urn:microsoft.com/office/officeart/2005/8/layout/chevron2"/>
     <dgm:cxn modelId="{794D3A5B-1F66-9441-9FF2-549747AADA21}" type="presOf" srcId="{0C74DDE5-75CB-124B-B5C4-976264A60AC4}" destId="{F0F316E0-926D-5E44-AE5A-D486244BC255}" srcOrd="0" destOrd="0" presId="urn:microsoft.com/office/officeart/2005/8/layout/chevron2"/>
     <dgm:cxn modelId="{6794A463-5F1A-D340-A8E8-BF92611A31F7}" type="presOf" srcId="{2226237A-BBDD-F240-B636-696E5A3F73FA}" destId="{63D2E7AD-D9DC-554C-A9D5-CC3A0C436858}" srcOrd="0" destOrd="0" presId="urn:microsoft.com/office/officeart/2005/8/layout/chevron2"/>
     <dgm:cxn modelId="{1EA8AB67-2E27-1246-8A44-BDEF417AAA48}" type="presOf" srcId="{A62FF51C-C761-DC4D-8D4D-A4BEEEE1E40E}" destId="{A9925412-98E5-754D-AD61-0A7C67317DFA}" srcOrd="0" destOrd="0" presId="urn:microsoft.com/office/officeart/2005/8/layout/chevron2"/>
@@ -3429,6 +3445,8 @@
     <dgm:cxn modelId="{00DDE86B-2926-8B48-9BD2-190A17697D7F}" srcId="{F3AD1DA9-4C09-1740-8685-7F7C82914C75}" destId="{19F60B9A-F6F3-3045-A587-B2B518082C4F}" srcOrd="0" destOrd="0" parTransId="{F31E8743-D360-7343-A450-C2C8684FEF73}" sibTransId="{2C70B312-D2F7-B540-9E35-1D73BFF274D1}"/>
     <dgm:cxn modelId="{474DCA6E-482E-A64A-8E5E-B008E0B3D745}" type="presOf" srcId="{A06E0055-4D58-BD41-8E67-874541574EE3}" destId="{FC420762-C8C7-D843-9B91-39162E67B737}" srcOrd="0" destOrd="0" presId="urn:microsoft.com/office/officeart/2005/8/layout/chevron2"/>
     <dgm:cxn modelId="{AE043973-D797-F747-9F54-A45D0B37DCC0}" type="presOf" srcId="{1316ED57-B987-A746-8491-E847B0D65357}" destId="{BF5814CC-75DE-454F-9842-D5F74FDAFBF9}" srcOrd="0" destOrd="0" presId="urn:microsoft.com/office/officeart/2005/8/layout/chevron2"/>
+    <dgm:cxn modelId="{54A7BE53-1483-E04B-8795-D1F2BFC6B3ED}" type="presOf" srcId="{B7EAE4D8-817B-0546-A572-06E6D63807F1}" destId="{6EE28908-DD59-2847-929A-38C430F0B19F}" srcOrd="0" destOrd="0" presId="urn:microsoft.com/office/officeart/2005/8/layout/chevron2"/>
+    <dgm:cxn modelId="{E542E056-4172-6A4D-BD2F-4F3C53081B6F}" type="presOf" srcId="{19F60B9A-F6F3-3045-A587-B2B518082C4F}" destId="{E2E8E3C3-6FDF-9446-98CF-6A830EDBB04D}" srcOrd="0" destOrd="0" presId="urn:microsoft.com/office/officeart/2005/8/layout/chevron2"/>
     <dgm:cxn modelId="{D3586587-2F7A-B847-ACCC-D0CA5B2D0961}" srcId="{19F60B9A-F6F3-3045-A587-B2B518082C4F}" destId="{1316ED57-B987-A746-8491-E847B0D65357}" srcOrd="0" destOrd="0" parTransId="{714A4B8E-37D0-884F-8899-974210EE1C78}" sibTransId="{799D8249-EC17-D54F-8EE1-FFCC2A1D2A4D}"/>
     <dgm:cxn modelId="{398A58A0-DB71-D447-8DF8-96FDC84D9B88}" srcId="{0C74DDE5-75CB-124B-B5C4-976264A60AC4}" destId="{53506C35-F3DF-2544-B56E-E4D90B5E4331}" srcOrd="0" destOrd="0" parTransId="{25C8C944-AE17-B64B-904D-15E10A5BFAC0}" sibTransId="{E9AE0E25-60DF-3546-9312-C6CA7A8BDF65}"/>
     <dgm:cxn modelId="{D7D5EAA7-3AEF-414D-BFFA-6D989D535776}" srcId="{F3AD1DA9-4C09-1740-8685-7F7C82914C75}" destId="{A62FF51C-C761-DC4D-8D4D-A4BEEEE1E40E}" srcOrd="4" destOrd="0" parTransId="{0675E263-70A6-4446-A2D9-D2D6110F48A2}" sibTransId="{9A7E60D6-57BD-7444-8122-73BE6CE07FB4}"/>
@@ -3914,9 +3932,9 @@
   <dgm:cxnLst>
     <dgm:cxn modelId="{9BFBC51D-441C-A147-8E73-298CDC8F73C0}" srcId="{5C78B4C1-F6FA-4A49-802F-77977558D053}" destId="{54C580C9-5B36-D643-A90A-488254D81868}" srcOrd="1" destOrd="0" parTransId="{71204BC0-967A-E443-BE47-48E16FFCCCD8}" sibTransId="{8FA9DF7E-8289-9F42-BD53-43860EBE5B1D}"/>
     <dgm:cxn modelId="{78F0342D-96D3-C449-B7C5-BC321DA0D11A}" type="presOf" srcId="{0A340C7F-32D6-DB45-A542-F6602CBD8AA4}" destId="{9815FFFB-2873-DA48-B072-A4D63622ACD0}" srcOrd="1" destOrd="0" presId="urn:microsoft.com/office/officeart/2005/8/layout/vProcess5"/>
-    <dgm:cxn modelId="{D5936358-88E1-C142-BD92-8003DA0F8BA8}" type="presOf" srcId="{54C580C9-5B36-D643-A90A-488254D81868}" destId="{AE9A4F57-D1CD-8748-8ED3-32A08F84F1A7}" srcOrd="1" destOrd="0" presId="urn:microsoft.com/office/officeart/2005/8/layout/vProcess5"/>
     <dgm:cxn modelId="{0554F667-0113-2C4C-BE28-1805A527F2D6}" type="presOf" srcId="{7DB915FC-2CF5-B54C-B10C-4A01354DF7A2}" destId="{29B37D13-0E36-3848-82FB-3D91C6B22D40}" srcOrd="0" destOrd="0" presId="urn:microsoft.com/office/officeart/2005/8/layout/vProcess5"/>
     <dgm:cxn modelId="{F3E3A56D-63E4-1943-9A18-A30F3AED8E9D}" type="presOf" srcId="{8FA9DF7E-8289-9F42-BD53-43860EBE5B1D}" destId="{99474D39-C8BC-4B4B-9829-8E88047990F3}" srcOrd="0" destOrd="0" presId="urn:microsoft.com/office/officeart/2005/8/layout/vProcess5"/>
+    <dgm:cxn modelId="{D5936358-88E1-C142-BD92-8003DA0F8BA8}" type="presOf" srcId="{54C580C9-5B36-D643-A90A-488254D81868}" destId="{AE9A4F57-D1CD-8748-8ED3-32A08F84F1A7}" srcOrd="1" destOrd="0" presId="urn:microsoft.com/office/officeart/2005/8/layout/vProcess5"/>
     <dgm:cxn modelId="{4DD6D09E-0C5E-F04F-BD44-771206F9AF5E}" type="presOf" srcId="{54C580C9-5B36-D643-A90A-488254D81868}" destId="{1EF8BC82-0735-CC46-BB8A-E654A08F5E14}" srcOrd="0" destOrd="0" presId="urn:microsoft.com/office/officeart/2005/8/layout/vProcess5"/>
     <dgm:cxn modelId="{B5F04D9F-4B5C-1949-AE2C-541CD1CC4A69}" srcId="{5C78B4C1-F6FA-4A49-802F-77977558D053}" destId="{0A340C7F-32D6-DB45-A542-F6602CBD8AA4}" srcOrd="2" destOrd="0" parTransId="{3A041A63-C458-1942-9BFC-FE7B403EF74D}" sibTransId="{871D0F82-E88C-A341-BDA3-8AE5B319B8F6}"/>
     <dgm:cxn modelId="{34867BAE-1FA6-BA49-A712-973E905ACFF1}" type="presOf" srcId="{67E6D007-BDC1-954F-B9D1-B487462B0B09}" destId="{B0CC14DC-810A-5D44-B981-AB60551693A3}" srcOrd="0" destOrd="0" presId="urn:microsoft.com/office/officeart/2005/8/layout/vProcess5"/>
@@ -11759,6 +11777,356 @@
 </dgm:styleDef>
 </file>
 
+<file path=ppt/notesMasters/notesMaster1.xml><?xml version="1.0" encoding="utf-8"?>
+<p:notesMaster xmlns:a="http://schemas.openxmlformats.org/drawingml/2006/main" xmlns:r="http://schemas.openxmlformats.org/officeDocument/2006/relationships" xmlns:p="http://schemas.openxmlformats.org/presentationml/2006/main">
+  <p:cSld>
+    <p:bg>
+      <p:bgRef idx="1001">
+        <a:schemeClr val="bg1"/>
+      </p:bgRef>
+    </p:bg>
+    <p:spTree>
+      <p:nvGrpSpPr>
+        <p:cNvPr id="1" name=""/>
+        <p:cNvGrpSpPr/>
+        <p:nvPr/>
+      </p:nvGrpSpPr>
+      <p:grpSpPr>
+        <a:xfrm>
+          <a:off x="0" y="0"/>
+          <a:ext cx="0" cy="0"/>
+          <a:chOff x="0" y="0"/>
+          <a:chExt cx="0" cy="0"/>
+        </a:xfrm>
+      </p:grpSpPr>
+      <p:sp>
+        <p:nvSpPr>
+          <p:cNvPr id="2" name="Header Placeholder 1"/>
+          <p:cNvSpPr>
+            <a:spLocks noGrp="1"/>
+          </p:cNvSpPr>
+          <p:nvPr>
+            <p:ph type="hdr" sz="quarter"/>
+          </p:nvPr>
+        </p:nvSpPr>
+        <p:spPr>
+          <a:xfrm>
+            <a:off x="0" y="0"/>
+            <a:ext cx="2971800" cy="458788"/>
+          </a:xfrm>
+          <a:prstGeom prst="rect">
+            <a:avLst/>
+          </a:prstGeom>
+        </p:spPr>
+        <p:txBody>
+          <a:bodyPr vert="horz" lIns="91440" tIns="45720" rIns="91440" bIns="45720" rtlCol="0"/>
+          <a:lstStyle>
+            <a:lvl1pPr algn="l">
+              <a:defRPr sz="1200"/>
+            </a:lvl1pPr>
+          </a:lstStyle>
+          <a:p>
+            <a:endParaRPr lang="en-AU"/>
+          </a:p>
+        </p:txBody>
+      </p:sp>
+      <p:sp>
+        <p:nvSpPr>
+          <p:cNvPr id="3" name="Date Placeholder 2"/>
+          <p:cNvSpPr>
+            <a:spLocks noGrp="1"/>
+          </p:cNvSpPr>
+          <p:nvPr>
+            <p:ph type="dt" idx="1"/>
+          </p:nvPr>
+        </p:nvSpPr>
+        <p:spPr>
+          <a:xfrm>
+            <a:off x="3884613" y="0"/>
+            <a:ext cx="2971800" cy="458788"/>
+          </a:xfrm>
+          <a:prstGeom prst="rect">
+            <a:avLst/>
+          </a:prstGeom>
+        </p:spPr>
+        <p:txBody>
+          <a:bodyPr vert="horz" lIns="91440" tIns="45720" rIns="91440" bIns="45720" rtlCol="0"/>
+          <a:lstStyle>
+            <a:lvl1pPr algn="r">
+              <a:defRPr sz="1200"/>
+            </a:lvl1pPr>
+          </a:lstStyle>
+          <a:p>
+            <a:fld id="{485A6EB2-FA01-4BFD-AAFB-A06C68F7E8CB}" type="datetimeFigureOut">
+              <a:rPr lang="en-AU" smtClean="0"/>
+              <a:t>1/06/2023</a:t>
+            </a:fld>
+            <a:endParaRPr lang="en-AU"/>
+          </a:p>
+        </p:txBody>
+      </p:sp>
+      <p:sp>
+        <p:nvSpPr>
+          <p:cNvPr id="4" name="Slide Image Placeholder 3"/>
+          <p:cNvSpPr>
+            <a:spLocks noGrp="1" noRot="1" noChangeAspect="1"/>
+          </p:cNvSpPr>
+          <p:nvPr>
+            <p:ph type="sldImg" idx="2"/>
+          </p:nvPr>
+        </p:nvSpPr>
+        <p:spPr>
+          <a:xfrm>
+            <a:off x="685800" y="1143000"/>
+            <a:ext cx="5486400" cy="3086100"/>
+          </a:xfrm>
+          <a:prstGeom prst="rect">
+            <a:avLst/>
+          </a:prstGeom>
+          <a:noFill/>
+          <a:ln w="12700">
+            <a:solidFill>
+              <a:prstClr val="black"/>
+            </a:solidFill>
+          </a:ln>
+        </p:spPr>
+        <p:txBody>
+          <a:bodyPr vert="horz" lIns="91440" tIns="45720" rIns="91440" bIns="45720" rtlCol="0" anchor="ctr"/>
+          <a:lstStyle/>
+          <a:p>
+            <a:endParaRPr lang="en-AU"/>
+          </a:p>
+        </p:txBody>
+      </p:sp>
+      <p:sp>
+        <p:nvSpPr>
+          <p:cNvPr id="5" name="Notes Placeholder 4"/>
+          <p:cNvSpPr>
+            <a:spLocks noGrp="1"/>
+          </p:cNvSpPr>
+          <p:nvPr>
+            <p:ph type="body" sz="quarter" idx="3"/>
+          </p:nvPr>
+        </p:nvSpPr>
+        <p:spPr>
+          <a:xfrm>
+            <a:off x="685800" y="4400550"/>
+            <a:ext cx="5486400" cy="3600450"/>
+          </a:xfrm>
+          <a:prstGeom prst="rect">
+            <a:avLst/>
+          </a:prstGeom>
+        </p:spPr>
+        <p:txBody>
+          <a:bodyPr vert="horz" lIns="91440" tIns="45720" rIns="91440" bIns="45720" rtlCol="0"/>
+          <a:lstStyle/>
+          <a:p>
+            <a:pPr lvl="0"/>
+            <a:r>
+              <a:rPr lang="en-US"/>
+              <a:t>Click to edit Master text styles</a:t>
+            </a:r>
+          </a:p>
+          <a:p>
+            <a:pPr lvl="1"/>
+            <a:r>
+              <a:rPr lang="en-US"/>
+              <a:t>Second level</a:t>
+            </a:r>
+          </a:p>
+          <a:p>
+            <a:pPr lvl="2"/>
+            <a:r>
+              <a:rPr lang="en-US"/>
+              <a:t>Third level</a:t>
+            </a:r>
+          </a:p>
+          <a:p>
+            <a:pPr lvl="3"/>
+            <a:r>
+              <a:rPr lang="en-US"/>
+              <a:t>Fourth level</a:t>
+            </a:r>
+          </a:p>
+          <a:p>
+            <a:pPr lvl="4"/>
+            <a:r>
+              <a:rPr lang="en-US"/>
+              <a:t>Fifth level</a:t>
+            </a:r>
+            <a:endParaRPr lang="en-AU"/>
+          </a:p>
+        </p:txBody>
+      </p:sp>
+      <p:sp>
+        <p:nvSpPr>
+          <p:cNvPr id="6" name="Footer Placeholder 5"/>
+          <p:cNvSpPr>
+            <a:spLocks noGrp="1"/>
+          </p:cNvSpPr>
+          <p:nvPr>
+            <p:ph type="ftr" sz="quarter" idx="4"/>
+          </p:nvPr>
+        </p:nvSpPr>
+        <p:spPr>
+          <a:xfrm>
+            <a:off x="0" y="8685213"/>
+            <a:ext cx="2971800" cy="458787"/>
+          </a:xfrm>
+          <a:prstGeom prst="rect">
+            <a:avLst/>
+          </a:prstGeom>
+        </p:spPr>
+        <p:txBody>
+          <a:bodyPr vert="horz" lIns="91440" tIns="45720" rIns="91440" bIns="45720" rtlCol="0" anchor="b"/>
+          <a:lstStyle>
+            <a:lvl1pPr algn="l">
+              <a:defRPr sz="1200"/>
+            </a:lvl1pPr>
+          </a:lstStyle>
+          <a:p>
+            <a:endParaRPr lang="en-AU"/>
+          </a:p>
+        </p:txBody>
+      </p:sp>
+      <p:sp>
+        <p:nvSpPr>
+          <p:cNvPr id="7" name="Slide Number Placeholder 6"/>
+          <p:cNvSpPr>
+            <a:spLocks noGrp="1"/>
+          </p:cNvSpPr>
+          <p:nvPr>
+            <p:ph type="sldNum" sz="quarter" idx="5"/>
+          </p:nvPr>
+        </p:nvSpPr>
+        <p:spPr>
+          <a:xfrm>
+            <a:off x="3884613" y="8685213"/>
+            <a:ext cx="2971800" cy="458787"/>
+          </a:xfrm>
+          <a:prstGeom prst="rect">
+            <a:avLst/>
+          </a:prstGeom>
+        </p:spPr>
+        <p:txBody>
+          <a:bodyPr vert="horz" lIns="91440" tIns="45720" rIns="91440" bIns="45720" rtlCol="0" anchor="b"/>
+          <a:lstStyle>
+            <a:lvl1pPr algn="r">
+              <a:defRPr sz="1200"/>
+            </a:lvl1pPr>
+          </a:lstStyle>
+          <a:p>
+            <a:fld id="{0CD2B6D0-44CB-486A-BE25-CE78810180F6}" type="slidenum">
+              <a:rPr lang="en-AU" smtClean="0"/>
+              <a:t>‹#›</a:t>
+            </a:fld>
+            <a:endParaRPr lang="en-AU"/>
+          </a:p>
+        </p:txBody>
+      </p:sp>
+    </p:spTree>
+    <p:extLst>
+      <p:ext uri="{BB962C8B-B14F-4D97-AF65-F5344CB8AC3E}">
+        <p14:creationId xmlns:p14="http://schemas.microsoft.com/office/powerpoint/2010/main" val="1866114266"/>
+      </p:ext>
+    </p:extLst>
+  </p:cSld>
+  <p:clrMap bg1="lt1" tx1="dk1" bg2="lt2" tx2="dk2" accent1="accent1" accent2="accent2" accent3="accent3" accent4="accent4" accent5="accent5" accent6="accent6" hlink="hlink" folHlink="folHlink"/>
+  <p:notesStyle>
+    <a:lvl1pPr marL="0" algn="l" defTabSz="914400" rtl="0" eaLnBrk="1" latinLnBrk="0" hangingPunct="1">
+      <a:defRPr sz="1200" kern="1200">
+        <a:solidFill>
+          <a:schemeClr val="tx1"/>
+        </a:solidFill>
+        <a:latin typeface="+mn-lt"/>
+        <a:ea typeface="+mn-ea"/>
+        <a:cs typeface="+mn-cs"/>
+      </a:defRPr>
+    </a:lvl1pPr>
+    <a:lvl2pPr marL="457200" algn="l" defTabSz="914400" rtl="0" eaLnBrk="1" latinLnBrk="0" hangingPunct="1">
+      <a:defRPr sz="1200" kern="1200">
+        <a:solidFill>
+          <a:schemeClr val="tx1"/>
+        </a:solidFill>
+        <a:latin typeface="+mn-lt"/>
+        <a:ea typeface="+mn-ea"/>
+        <a:cs typeface="+mn-cs"/>
+      </a:defRPr>
+    </a:lvl2pPr>
+    <a:lvl3pPr marL="914400" algn="l" defTabSz="914400" rtl="0" eaLnBrk="1" latinLnBrk="0" hangingPunct="1">
+      <a:defRPr sz="1200" kern="1200">
+        <a:solidFill>
+          <a:schemeClr val="tx1"/>
+        </a:solidFill>
+        <a:latin typeface="+mn-lt"/>
+        <a:ea typeface="+mn-ea"/>
+        <a:cs typeface="+mn-cs"/>
+      </a:defRPr>
+    </a:lvl3pPr>
+    <a:lvl4pPr marL="1371600" algn="l" defTabSz="914400" rtl="0" eaLnBrk="1" latinLnBrk="0" hangingPunct="1">
+      <a:defRPr sz="1200" kern="1200">
+        <a:solidFill>
+          <a:schemeClr val="tx1"/>
+        </a:solidFill>
+        <a:latin typeface="+mn-lt"/>
+        <a:ea typeface="+mn-ea"/>
+        <a:cs typeface="+mn-cs"/>
+      </a:defRPr>
+    </a:lvl4pPr>
+    <a:lvl5pPr marL="1828800" algn="l" defTabSz="914400" rtl="0" eaLnBrk="1" latinLnBrk="0" hangingPunct="1">
+      <a:defRPr sz="1200" kern="1200">
+        <a:solidFill>
+          <a:schemeClr val="tx1"/>
+        </a:solidFill>
+        <a:latin typeface="+mn-lt"/>
+        <a:ea typeface="+mn-ea"/>
+        <a:cs typeface="+mn-cs"/>
+      </a:defRPr>
+    </a:lvl5pPr>
+    <a:lvl6pPr marL="2286000" algn="l" defTabSz="914400" rtl="0" eaLnBrk="1" latinLnBrk="0" hangingPunct="1">
+      <a:defRPr sz="1200" kern="1200">
+        <a:solidFill>
+          <a:schemeClr val="tx1"/>
+        </a:solidFill>
+        <a:latin typeface="+mn-lt"/>
+        <a:ea typeface="+mn-ea"/>
+        <a:cs typeface="+mn-cs"/>
+      </a:defRPr>
+    </a:lvl6pPr>
+    <a:lvl7pPr marL="2743200" algn="l" defTabSz="914400" rtl="0" eaLnBrk="1" latinLnBrk="0" hangingPunct="1">
+      <a:defRPr sz="1200" kern="1200">
+        <a:solidFill>
+          <a:schemeClr val="tx1"/>
+        </a:solidFill>
+        <a:latin typeface="+mn-lt"/>
+        <a:ea typeface="+mn-ea"/>
+        <a:cs typeface="+mn-cs"/>
+      </a:defRPr>
+    </a:lvl7pPr>
+    <a:lvl8pPr marL="3200400" algn="l" defTabSz="914400" rtl="0" eaLnBrk="1" latinLnBrk="0" hangingPunct="1">
+      <a:defRPr sz="1200" kern="1200">
+        <a:solidFill>
+          <a:schemeClr val="tx1"/>
+        </a:solidFill>
+        <a:latin typeface="+mn-lt"/>
+        <a:ea typeface="+mn-ea"/>
+        <a:cs typeface="+mn-cs"/>
+      </a:defRPr>
+    </a:lvl8pPr>
+    <a:lvl9pPr marL="3657600" algn="l" defTabSz="914400" rtl="0" eaLnBrk="1" latinLnBrk="0" hangingPunct="1">
+      <a:defRPr sz="1200" kern="1200">
+        <a:solidFill>
+          <a:schemeClr val="tx1"/>
+        </a:solidFill>
+        <a:latin typeface="+mn-lt"/>
+        <a:ea typeface="+mn-ea"/>
+        <a:cs typeface="+mn-cs"/>
+      </a:defRPr>
+    </a:lvl9pPr>
+  </p:notesStyle>
+</p:notesMaster>
+</file>
+
 <file path=ppt/slideLayouts/slideLayout1.xml><?xml version="1.0" encoding="utf-8"?>
 <p:sldLayout xmlns:a="http://schemas.openxmlformats.org/drawingml/2006/main" xmlns:r="http://schemas.openxmlformats.org/officeDocument/2006/relationships" xmlns:p="http://schemas.openxmlformats.org/presentationml/2006/main" type="title" preserve="1">
   <p:cSld name="Title Slide">
@@ -11906,9 +12274,9 @@
           <a:bodyPr/>
           <a:lstStyle/>
           <a:p>
-            <a:fld id="{A117FC55-09B6-664E-A48C-8C39C1B8D896}" type="datetimeFigureOut">
+            <a:fld id="{520E703A-A14B-4DE5-A03C-A003D78AD194}" type="datetime1">
               <a:rPr lang="en-US" smtClean="0"/>
-              <a:t>6/1/23</a:t>
+              <a:t>6/1/2023</a:t>
             </a:fld>
             <a:endParaRPr lang="en-US"/>
           </a:p>
@@ -12106,9 +12474,9 @@
           <a:bodyPr/>
           <a:lstStyle/>
           <a:p>
-            <a:fld id="{A117FC55-09B6-664E-A48C-8C39C1B8D896}" type="datetimeFigureOut">
+            <a:fld id="{73D8D68A-9EBE-4C58-A0CF-9A94687A3376}" type="datetime1">
               <a:rPr lang="en-US" smtClean="0"/>
-              <a:t>6/1/23</a:t>
+              <a:t>6/1/2023</a:t>
             </a:fld>
             <a:endParaRPr lang="en-US"/>
           </a:p>
@@ -12316,9 +12684,9 @@
           <a:bodyPr/>
           <a:lstStyle/>
           <a:p>
-            <a:fld id="{A117FC55-09B6-664E-A48C-8C39C1B8D896}" type="datetimeFigureOut">
+            <a:fld id="{7B4A25C5-8483-46B4-8B64-03D8BB6EDD43}" type="datetime1">
               <a:rPr lang="en-US" smtClean="0"/>
-              <a:t>6/1/23</a:t>
+              <a:t>6/1/2023</a:t>
             </a:fld>
             <a:endParaRPr lang="en-US"/>
           </a:p>
@@ -12497,35 +12865,6 @@
       </p:sp>
       <p:sp>
         <p:nvSpPr>
-          <p:cNvPr id="4" name="Date Placeholder 3">
-            <a:extLst>
-              <a:ext uri="{FF2B5EF4-FFF2-40B4-BE49-F238E27FC236}">
-                <a16:creationId xmlns:a16="http://schemas.microsoft.com/office/drawing/2014/main" id="{1511E257-80E4-5F79-AA47-EB5D1D294682}"/>
-              </a:ext>
-            </a:extLst>
-          </p:cNvPr>
-          <p:cNvSpPr>
-            <a:spLocks noGrp="1"/>
-          </p:cNvSpPr>
-          <p:nvPr>
-            <p:ph type="dt" sz="half" idx="10"/>
-          </p:nvPr>
-        </p:nvSpPr>
-        <p:spPr/>
-        <p:txBody>
-          <a:bodyPr/>
-          <a:lstStyle/>
-          <a:p>
-            <a:fld id="{A117FC55-09B6-664E-A48C-8C39C1B8D896}" type="datetimeFigureOut">
-              <a:rPr lang="en-US" smtClean="0"/>
-              <a:t>6/1/23</a:t>
-            </a:fld>
-            <a:endParaRPr lang="en-US"/>
-          </a:p>
-        </p:txBody>
-      </p:sp>
-      <p:sp>
-        <p:nvSpPr>
           <p:cNvPr id="5" name="Footer Placeholder 4">
             <a:extLst>
               <a:ext uri="{FF2B5EF4-FFF2-40B4-BE49-F238E27FC236}">
@@ -12565,13 +12904,29 @@
             <p:ph type="sldNum" sz="quarter" idx="12"/>
           </p:nvPr>
         </p:nvSpPr>
-        <p:spPr/>
+        <p:spPr>
+          <a:xfrm>
+            <a:off x="60278" y="6492875"/>
+            <a:ext cx="2743200" cy="365125"/>
+          </a:xfrm>
+        </p:spPr>
         <p:txBody>
           <a:bodyPr/>
-          <a:lstStyle/>
+          <a:lstStyle>
+            <a:lvl1pPr algn="l">
+              <a:defRPr sz="1600" b="1" i="1" u="sng">
+                <a:solidFill>
+                  <a:schemeClr val="tx1"/>
+                </a:solidFill>
+                <a:latin typeface="Aharoni" panose="020B0604020202020204" pitchFamily="2" charset="-79"/>
+                <a:cs typeface="Aharoni" panose="020B0604020202020204" pitchFamily="2" charset="-79"/>
+              </a:defRPr>
+            </a:lvl1pPr>
+          </a:lstStyle>
           <a:p>
             <a:fld id="{4F34D30B-D7E0-FB45-A278-C7D854F08543}" type="slidenum">
               <a:rPr lang="en-US" smtClean="0"/>
+              <a:pPr/>
               <a:t>‹#›</a:t>
             </a:fld>
             <a:endParaRPr lang="en-US"/>
@@ -12792,9 +13147,9 @@
           <a:bodyPr/>
           <a:lstStyle/>
           <a:p>
-            <a:fld id="{A117FC55-09B6-664E-A48C-8C39C1B8D896}" type="datetimeFigureOut">
+            <a:fld id="{770AA5BA-DC1A-44D0-AEF4-00125352215D}" type="datetime1">
               <a:rPr lang="en-US" smtClean="0"/>
-              <a:t>6/1/23</a:t>
+              <a:t>6/1/2023</a:t>
             </a:fld>
             <a:endParaRPr lang="en-US"/>
           </a:p>
@@ -13060,9 +13415,9 @@
           <a:bodyPr/>
           <a:lstStyle/>
           <a:p>
-            <a:fld id="{A117FC55-09B6-664E-A48C-8C39C1B8D896}" type="datetimeFigureOut">
+            <a:fld id="{2AB21B40-432C-4CD2-BDB9-F21B8E6039C6}" type="datetime1">
               <a:rPr lang="en-US" smtClean="0"/>
-              <a:t>6/1/23</a:t>
+              <a:t>6/1/2023</a:t>
             </a:fld>
             <a:endParaRPr lang="en-US"/>
           </a:p>
@@ -13475,9 +13830,9 @@
           <a:bodyPr/>
           <a:lstStyle/>
           <a:p>
-            <a:fld id="{A117FC55-09B6-664E-A48C-8C39C1B8D896}" type="datetimeFigureOut">
+            <a:fld id="{5D6B19EF-D3DF-423D-B02F-A4992B6DF41D}" type="datetime1">
               <a:rPr lang="en-US" smtClean="0"/>
-              <a:t>6/1/23</a:t>
+              <a:t>6/1/2023</a:t>
             </a:fld>
             <a:endParaRPr lang="en-US"/>
           </a:p>
@@ -13617,9 +13972,9 @@
           <a:bodyPr/>
           <a:lstStyle/>
           <a:p>
-            <a:fld id="{A117FC55-09B6-664E-A48C-8C39C1B8D896}" type="datetimeFigureOut">
+            <a:fld id="{840DB5C2-2B49-4D22-8F79-03C9DF57F18B}" type="datetime1">
               <a:rPr lang="en-US" smtClean="0"/>
-              <a:t>6/1/23</a:t>
+              <a:t>6/1/2023</a:t>
             </a:fld>
             <a:endParaRPr lang="en-US"/>
           </a:p>
@@ -13730,9 +14085,9 @@
           <a:bodyPr/>
           <a:lstStyle/>
           <a:p>
-            <a:fld id="{A117FC55-09B6-664E-A48C-8C39C1B8D896}" type="datetimeFigureOut">
+            <a:fld id="{631DE7E8-C68D-4BD3-AB6A-F707AF362335}" type="datetime1">
               <a:rPr lang="en-US" smtClean="0"/>
-              <a:t>6/1/23</a:t>
+              <a:t>6/1/2023</a:t>
             </a:fld>
             <a:endParaRPr lang="en-US"/>
           </a:p>
@@ -14043,9 +14398,9 @@
           <a:bodyPr/>
           <a:lstStyle/>
           <a:p>
-            <a:fld id="{A117FC55-09B6-664E-A48C-8C39C1B8D896}" type="datetimeFigureOut">
+            <a:fld id="{F9AC128F-B800-42E7-874E-2705FBAC753E}" type="datetime1">
               <a:rPr lang="en-US" smtClean="0"/>
-              <a:t>6/1/23</a:t>
+              <a:t>6/1/2023</a:t>
             </a:fld>
             <a:endParaRPr lang="en-US"/>
           </a:p>
@@ -14332,9 +14687,9 @@
           <a:bodyPr/>
           <a:lstStyle/>
           <a:p>
-            <a:fld id="{A117FC55-09B6-664E-A48C-8C39C1B8D896}" type="datetimeFigureOut">
+            <a:fld id="{97C6F4EF-788B-474B-A7B4-C61B78D3DEEE}" type="datetime1">
               <a:rPr lang="en-US" smtClean="0"/>
-              <a:t>6/1/23</a:t>
+              <a:t>6/1/2023</a:t>
             </a:fld>
             <a:endParaRPr lang="en-US"/>
           </a:p>
@@ -14575,9 +14930,9 @@
             </a:lvl1pPr>
           </a:lstStyle>
           <a:p>
-            <a:fld id="{A117FC55-09B6-664E-A48C-8C39C1B8D896}" type="datetimeFigureOut">
+            <a:fld id="{41359ADD-F6F9-41E2-B3AA-6E6D79540949}" type="datetime1">
               <a:rPr lang="en-US" smtClean="0"/>
-              <a:t>6/1/23</a:t>
+              <a:t>6/1/2023</a:t>
             </a:fld>
             <a:endParaRPr lang="en-US"/>
           </a:p>
@@ -14694,6 +15049,7 @@
     <p:sldLayoutId id="2147483658" r:id="rId10"/>
     <p:sldLayoutId id="2147483659" r:id="rId11"/>
   </p:sldLayoutIdLst>
+  <p:hf hdr="0" ftr="0" dt="0"/>
   <p:txStyles>
     <p:titleStyle>
       <a:lvl1pPr algn="l" defTabSz="914400" rtl="0" eaLnBrk="1" latinLnBrk="0" hangingPunct="1">
@@ -16396,6 +16752,36 @@
           </a:p>
         </p:txBody>
       </p:sp>
+      <p:sp>
+        <p:nvSpPr>
+          <p:cNvPr id="10" name="Slide Number Placeholder 9">
+            <a:extLst>
+              <a:ext uri="{FF2B5EF4-FFF2-40B4-BE49-F238E27FC236}">
+                <a16:creationId xmlns:a16="http://schemas.microsoft.com/office/drawing/2014/main" id="{C68AC21D-35E9-E70F-6295-92CDEEA90F74}"/>
+              </a:ext>
+            </a:extLst>
+          </p:cNvPr>
+          <p:cNvSpPr>
+            <a:spLocks noGrp="1"/>
+          </p:cNvSpPr>
+          <p:nvPr>
+            <p:ph type="sldNum" sz="quarter" idx="12"/>
+          </p:nvPr>
+        </p:nvSpPr>
+        <p:spPr/>
+        <p:txBody>
+          <a:bodyPr/>
+          <a:lstStyle/>
+          <a:p>
+            <a:fld id="{4F34D30B-D7E0-FB45-A278-C7D854F08543}" type="slidenum">
+              <a:rPr lang="en-US" smtClean="0"/>
+              <a:pPr/>
+              <a:t>10</a:t>
+            </a:fld>
+            <a:endParaRPr lang="en-US"/>
+          </a:p>
+        </p:txBody>
+      </p:sp>
     </p:spTree>
     <p:extLst>
       <p:ext uri="{BB962C8B-B14F-4D97-AF65-F5344CB8AC3E}">
@@ -17045,6 +17431,36 @@
           </a:extLst>
         </p:spPr>
       </p:pic>
+      <p:sp>
+        <p:nvSpPr>
+          <p:cNvPr id="4" name="Slide Number Placeholder 3">
+            <a:extLst>
+              <a:ext uri="{FF2B5EF4-FFF2-40B4-BE49-F238E27FC236}">
+                <a16:creationId xmlns:a16="http://schemas.microsoft.com/office/drawing/2014/main" id="{F29E5F23-CC05-16B1-FFFA-CCBBE652B285}"/>
+              </a:ext>
+            </a:extLst>
+          </p:cNvPr>
+          <p:cNvSpPr>
+            <a:spLocks noGrp="1"/>
+          </p:cNvSpPr>
+          <p:nvPr>
+            <p:ph type="sldNum" sz="quarter" idx="12"/>
+          </p:nvPr>
+        </p:nvSpPr>
+        <p:spPr/>
+        <p:txBody>
+          <a:bodyPr/>
+          <a:lstStyle/>
+          <a:p>
+            <a:fld id="{4F34D30B-D7E0-FB45-A278-C7D854F08543}" type="slidenum">
+              <a:rPr lang="en-US" smtClean="0"/>
+              <a:pPr/>
+              <a:t>11</a:t>
+            </a:fld>
+            <a:endParaRPr lang="en-US"/>
+          </a:p>
+        </p:txBody>
+      </p:sp>
     </p:spTree>
     <p:extLst>
       <p:ext uri="{BB962C8B-B14F-4D97-AF65-F5344CB8AC3E}">
@@ -17694,6 +18110,36 @@
           </a:extLst>
         </p:spPr>
       </p:pic>
+      <p:sp>
+        <p:nvSpPr>
+          <p:cNvPr id="4" name="Slide Number Placeholder 3">
+            <a:extLst>
+              <a:ext uri="{FF2B5EF4-FFF2-40B4-BE49-F238E27FC236}">
+                <a16:creationId xmlns:a16="http://schemas.microsoft.com/office/drawing/2014/main" id="{6AF44AE2-CC26-34C2-EF36-90ED0458D067}"/>
+              </a:ext>
+            </a:extLst>
+          </p:cNvPr>
+          <p:cNvSpPr>
+            <a:spLocks noGrp="1"/>
+          </p:cNvSpPr>
+          <p:nvPr>
+            <p:ph type="sldNum" sz="quarter" idx="12"/>
+          </p:nvPr>
+        </p:nvSpPr>
+        <p:spPr/>
+        <p:txBody>
+          <a:bodyPr/>
+          <a:lstStyle/>
+          <a:p>
+            <a:fld id="{4F34D30B-D7E0-FB45-A278-C7D854F08543}" type="slidenum">
+              <a:rPr lang="en-US" smtClean="0"/>
+              <a:pPr/>
+              <a:t>12</a:t>
+            </a:fld>
+            <a:endParaRPr lang="en-US"/>
+          </a:p>
+        </p:txBody>
+      </p:sp>
     </p:spTree>
     <p:extLst>
       <p:ext uri="{BB962C8B-B14F-4D97-AF65-F5344CB8AC3E}">
@@ -18343,6 +18789,36 @@
           </a:extLst>
         </p:spPr>
       </p:pic>
+      <p:sp>
+        <p:nvSpPr>
+          <p:cNvPr id="4" name="Slide Number Placeholder 3">
+            <a:extLst>
+              <a:ext uri="{FF2B5EF4-FFF2-40B4-BE49-F238E27FC236}">
+                <a16:creationId xmlns:a16="http://schemas.microsoft.com/office/drawing/2014/main" id="{3D9256B4-A3A3-B4AF-8D5E-4A37AE3AD01A}"/>
+              </a:ext>
+            </a:extLst>
+          </p:cNvPr>
+          <p:cNvSpPr>
+            <a:spLocks noGrp="1"/>
+          </p:cNvSpPr>
+          <p:nvPr>
+            <p:ph type="sldNum" sz="quarter" idx="12"/>
+          </p:nvPr>
+        </p:nvSpPr>
+        <p:spPr/>
+        <p:txBody>
+          <a:bodyPr/>
+          <a:lstStyle/>
+          <a:p>
+            <a:fld id="{4F34D30B-D7E0-FB45-A278-C7D854F08543}" type="slidenum">
+              <a:rPr lang="en-US" smtClean="0"/>
+              <a:pPr/>
+              <a:t>13</a:t>
+            </a:fld>
+            <a:endParaRPr lang="en-US"/>
+          </a:p>
+        </p:txBody>
+      </p:sp>
     </p:spTree>
     <p:extLst>
       <p:ext uri="{BB962C8B-B14F-4D97-AF65-F5344CB8AC3E}">
@@ -18504,6 +18980,36 @@
           </a:prstGeom>
         </p:spPr>
       </p:pic>
+      <p:sp>
+        <p:nvSpPr>
+          <p:cNvPr id="3" name="Slide Number Placeholder 2">
+            <a:extLst>
+              <a:ext uri="{FF2B5EF4-FFF2-40B4-BE49-F238E27FC236}">
+                <a16:creationId xmlns:a16="http://schemas.microsoft.com/office/drawing/2014/main" id="{5ECB40AD-DC22-C6A4-402B-13CC6FC2B398}"/>
+              </a:ext>
+            </a:extLst>
+          </p:cNvPr>
+          <p:cNvSpPr>
+            <a:spLocks noGrp="1"/>
+          </p:cNvSpPr>
+          <p:nvPr>
+            <p:ph type="sldNum" sz="quarter" idx="12"/>
+          </p:nvPr>
+        </p:nvSpPr>
+        <p:spPr/>
+        <p:txBody>
+          <a:bodyPr/>
+          <a:lstStyle/>
+          <a:p>
+            <a:fld id="{4F34D30B-D7E0-FB45-A278-C7D854F08543}" type="slidenum">
+              <a:rPr lang="en-US" smtClean="0"/>
+              <a:pPr/>
+              <a:t>14</a:t>
+            </a:fld>
+            <a:endParaRPr lang="en-US"/>
+          </a:p>
+        </p:txBody>
+      </p:sp>
     </p:spTree>
     <p:extLst>
       <p:ext uri="{BB962C8B-B14F-4D97-AF65-F5344CB8AC3E}">
@@ -19138,6 +19644,36 @@
           </a:custGeom>
         </p:spPr>
       </p:pic>
+      <p:sp>
+        <p:nvSpPr>
+          <p:cNvPr id="4" name="Slide Number Placeholder 3">
+            <a:extLst>
+              <a:ext uri="{FF2B5EF4-FFF2-40B4-BE49-F238E27FC236}">
+                <a16:creationId xmlns:a16="http://schemas.microsoft.com/office/drawing/2014/main" id="{F5D9C773-BF35-4940-FFD5-69B4BC9F1A58}"/>
+              </a:ext>
+            </a:extLst>
+          </p:cNvPr>
+          <p:cNvSpPr>
+            <a:spLocks noGrp="1"/>
+          </p:cNvSpPr>
+          <p:nvPr>
+            <p:ph type="sldNum" sz="quarter" idx="12"/>
+          </p:nvPr>
+        </p:nvSpPr>
+        <p:spPr/>
+        <p:txBody>
+          <a:bodyPr/>
+          <a:lstStyle/>
+          <a:p>
+            <a:fld id="{4F34D30B-D7E0-FB45-A278-C7D854F08543}" type="slidenum">
+              <a:rPr lang="en-US" smtClean="0"/>
+              <a:pPr/>
+              <a:t>2</a:t>
+            </a:fld>
+            <a:endParaRPr lang="en-US"/>
+          </a:p>
+        </p:txBody>
+      </p:sp>
     </p:spTree>
     <p:extLst>
       <p:ext uri="{BB962C8B-B14F-4D97-AF65-F5344CB8AC3E}">
@@ -19916,6 +20452,36 @@
           </a:p>
         </p:txBody>
       </p:sp>
+      <p:sp>
+        <p:nvSpPr>
+          <p:cNvPr id="4" name="Slide Number Placeholder 3">
+            <a:extLst>
+              <a:ext uri="{FF2B5EF4-FFF2-40B4-BE49-F238E27FC236}">
+                <a16:creationId xmlns:a16="http://schemas.microsoft.com/office/drawing/2014/main" id="{670A9300-C1AD-315C-BD8F-A97DB8DC63C5}"/>
+              </a:ext>
+            </a:extLst>
+          </p:cNvPr>
+          <p:cNvSpPr>
+            <a:spLocks noGrp="1"/>
+          </p:cNvSpPr>
+          <p:nvPr>
+            <p:ph type="sldNum" sz="quarter" idx="12"/>
+          </p:nvPr>
+        </p:nvSpPr>
+        <p:spPr/>
+        <p:txBody>
+          <a:bodyPr/>
+          <a:lstStyle/>
+          <a:p>
+            <a:fld id="{4F34D30B-D7E0-FB45-A278-C7D854F08543}" type="slidenum">
+              <a:rPr lang="en-US" smtClean="0"/>
+              <a:pPr/>
+              <a:t>3</a:t>
+            </a:fld>
+            <a:endParaRPr lang="en-US"/>
+          </a:p>
+        </p:txBody>
+      </p:sp>
     </p:spTree>
     <p:extLst>
       <p:ext uri="{BB962C8B-B14F-4D97-AF65-F5344CB8AC3E}">
@@ -20618,6 +21184,36 @@
           </a:p>
         </p:txBody>
       </p:sp>
+      <p:sp>
+        <p:nvSpPr>
+          <p:cNvPr id="4" name="Slide Number Placeholder 3">
+            <a:extLst>
+              <a:ext uri="{FF2B5EF4-FFF2-40B4-BE49-F238E27FC236}">
+                <a16:creationId xmlns:a16="http://schemas.microsoft.com/office/drawing/2014/main" id="{DD9D23E7-2737-1776-BDCA-53CF0C8D0351}"/>
+              </a:ext>
+            </a:extLst>
+          </p:cNvPr>
+          <p:cNvSpPr>
+            <a:spLocks noGrp="1"/>
+          </p:cNvSpPr>
+          <p:nvPr>
+            <p:ph type="sldNum" sz="quarter" idx="12"/>
+          </p:nvPr>
+        </p:nvSpPr>
+        <p:spPr/>
+        <p:txBody>
+          <a:bodyPr/>
+          <a:lstStyle/>
+          <a:p>
+            <a:fld id="{4F34D30B-D7E0-FB45-A278-C7D854F08543}" type="slidenum">
+              <a:rPr lang="en-US" smtClean="0"/>
+              <a:pPr/>
+              <a:t>4</a:t>
+            </a:fld>
+            <a:endParaRPr lang="en-US"/>
+          </a:p>
+        </p:txBody>
+      </p:sp>
     </p:spTree>
     <p:extLst>
       <p:ext uri="{BB962C8B-B14F-4D97-AF65-F5344CB8AC3E}">
@@ -20812,6 +21408,36 @@
           </a:graphicData>
         </a:graphic>
       </p:graphicFrame>
+      <p:sp>
+        <p:nvSpPr>
+          <p:cNvPr id="3" name="Slide Number Placeholder 2">
+            <a:extLst>
+              <a:ext uri="{FF2B5EF4-FFF2-40B4-BE49-F238E27FC236}">
+                <a16:creationId xmlns:a16="http://schemas.microsoft.com/office/drawing/2014/main" id="{C7704132-E95E-4BB3-E67E-FEBCF775796B}"/>
+              </a:ext>
+            </a:extLst>
+          </p:cNvPr>
+          <p:cNvSpPr>
+            <a:spLocks noGrp="1"/>
+          </p:cNvSpPr>
+          <p:nvPr>
+            <p:ph type="sldNum" sz="quarter" idx="12"/>
+          </p:nvPr>
+        </p:nvSpPr>
+        <p:spPr/>
+        <p:txBody>
+          <a:bodyPr/>
+          <a:lstStyle/>
+          <a:p>
+            <a:fld id="{4F34D30B-D7E0-FB45-A278-C7D854F08543}" type="slidenum">
+              <a:rPr lang="en-US" smtClean="0"/>
+              <a:pPr/>
+              <a:t>5</a:t>
+            </a:fld>
+            <a:endParaRPr lang="en-US"/>
+          </a:p>
+        </p:txBody>
+      </p:sp>
     </p:spTree>
     <p:extLst>
       <p:ext uri="{BB962C8B-B14F-4D97-AF65-F5344CB8AC3E}">
@@ -20917,14 +21543,14 @@
           <p:nvPr>
             <p:extLst>
               <p:ext uri="{D42A27DB-BD31-4B8C-83A1-F6EECF244321}">
-                <p14:modId xmlns:p14="http://schemas.microsoft.com/office/powerpoint/2010/main" val="4089094652"/>
+                <p14:modId xmlns:p14="http://schemas.microsoft.com/office/powerpoint/2010/main" val="974808456"/>
               </p:ext>
             </p:extLst>
           </p:nvPr>
         </p:nvGraphicFramePr>
         <p:xfrm>
-          <a:off x="0" y="1912884"/>
-          <a:ext cx="12192000" cy="5234150"/>
+          <a:off x="0" y="1767385"/>
+          <a:ext cx="12192000" cy="4674360"/>
         </p:xfrm>
         <a:graphic>
           <a:graphicData uri="http://schemas.openxmlformats.org/drawingml/2006/table">
@@ -20962,7 +21588,7 @@
                   </a:extLst>
                 </a:gridCol>
               </a:tblGrid>
-              <a:tr h="1046830">
+              <a:tr h="934872">
                 <a:tc>
                   <a:txBody>
                     <a:bodyPr/>
@@ -21021,7 +21647,7 @@
                   </a:ext>
                 </a:extLst>
               </a:tr>
-              <a:tr h="1046830">
+              <a:tr h="934872">
                 <a:tc>
                   <a:txBody>
                     <a:bodyPr/>
@@ -21100,7 +21726,7 @@
                   </a:ext>
                 </a:extLst>
               </a:tr>
-              <a:tr h="1046830">
+              <a:tr h="934872">
                 <a:tc>
                   <a:txBody>
                     <a:bodyPr/>
@@ -21163,7 +21789,7 @@
                   </a:ext>
                 </a:extLst>
               </a:tr>
-              <a:tr h="1046830">
+              <a:tr h="934872">
                 <a:tc>
                   <a:txBody>
                     <a:bodyPr/>
@@ -21226,7 +21852,7 @@
                   </a:ext>
                 </a:extLst>
               </a:tr>
-              <a:tr h="1046830">
+              <a:tr h="934872">
                 <a:tc>
                   <a:txBody>
                     <a:bodyPr/>
@@ -21324,6 +21950,36 @@
           </a:graphicData>
         </a:graphic>
       </p:graphicFrame>
+      <p:sp>
+        <p:nvSpPr>
+          <p:cNvPr id="3" name="Slide Number Placeholder 2">
+            <a:extLst>
+              <a:ext uri="{FF2B5EF4-FFF2-40B4-BE49-F238E27FC236}">
+                <a16:creationId xmlns:a16="http://schemas.microsoft.com/office/drawing/2014/main" id="{7BE77D6C-AE8D-6554-B4B1-EBD9DC9AA354}"/>
+              </a:ext>
+            </a:extLst>
+          </p:cNvPr>
+          <p:cNvSpPr>
+            <a:spLocks noGrp="1"/>
+          </p:cNvSpPr>
+          <p:nvPr>
+            <p:ph type="sldNum" sz="quarter" idx="12"/>
+          </p:nvPr>
+        </p:nvSpPr>
+        <p:spPr/>
+        <p:txBody>
+          <a:bodyPr/>
+          <a:lstStyle/>
+          <a:p>
+            <a:fld id="{4F34D30B-D7E0-FB45-A278-C7D854F08543}" type="slidenum">
+              <a:rPr lang="en-US" smtClean="0"/>
+              <a:pPr/>
+              <a:t>6</a:t>
+            </a:fld>
+            <a:endParaRPr lang="en-US"/>
+          </a:p>
+        </p:txBody>
+      </p:sp>
     </p:spTree>
     <p:extLst>
       <p:ext uri="{BB962C8B-B14F-4D97-AF65-F5344CB8AC3E}">
@@ -21680,6 +22336,36 @@
           </a:prstGeom>
         </p:spPr>
       </p:pic>
+      <p:sp>
+        <p:nvSpPr>
+          <p:cNvPr id="4" name="Slide Number Placeholder 3">
+            <a:extLst>
+              <a:ext uri="{FF2B5EF4-FFF2-40B4-BE49-F238E27FC236}">
+                <a16:creationId xmlns:a16="http://schemas.microsoft.com/office/drawing/2014/main" id="{A5DAE8F6-02BC-B155-1A40-101CD1912234}"/>
+              </a:ext>
+            </a:extLst>
+          </p:cNvPr>
+          <p:cNvSpPr>
+            <a:spLocks noGrp="1"/>
+          </p:cNvSpPr>
+          <p:nvPr>
+            <p:ph type="sldNum" sz="quarter" idx="12"/>
+          </p:nvPr>
+        </p:nvSpPr>
+        <p:spPr/>
+        <p:txBody>
+          <a:bodyPr/>
+          <a:lstStyle/>
+          <a:p>
+            <a:fld id="{4F34D30B-D7E0-FB45-A278-C7D854F08543}" type="slidenum">
+              <a:rPr lang="en-US" smtClean="0"/>
+              <a:pPr/>
+              <a:t>7</a:t>
+            </a:fld>
+            <a:endParaRPr lang="en-US"/>
+          </a:p>
+        </p:txBody>
+      </p:sp>
     </p:spTree>
     <p:extLst>
       <p:ext uri="{BB962C8B-B14F-4D97-AF65-F5344CB8AC3E}">
@@ -21932,6 +22618,36 @@
           </a:graphicData>
         </a:graphic>
       </p:graphicFrame>
+      <p:sp>
+        <p:nvSpPr>
+          <p:cNvPr id="5" name="Slide Number Placeholder 4">
+            <a:extLst>
+              <a:ext uri="{FF2B5EF4-FFF2-40B4-BE49-F238E27FC236}">
+                <a16:creationId xmlns:a16="http://schemas.microsoft.com/office/drawing/2014/main" id="{1F261DC3-AEBE-8566-AEF2-B178CD1D8F6D}"/>
+              </a:ext>
+            </a:extLst>
+          </p:cNvPr>
+          <p:cNvSpPr>
+            <a:spLocks noGrp="1"/>
+          </p:cNvSpPr>
+          <p:nvPr>
+            <p:ph type="sldNum" sz="quarter" idx="12"/>
+          </p:nvPr>
+        </p:nvSpPr>
+        <p:spPr/>
+        <p:txBody>
+          <a:bodyPr/>
+          <a:lstStyle/>
+          <a:p>
+            <a:fld id="{4F34D30B-D7E0-FB45-A278-C7D854F08543}" type="slidenum">
+              <a:rPr lang="en-US" smtClean="0"/>
+              <a:pPr/>
+              <a:t>8</a:t>
+            </a:fld>
+            <a:endParaRPr lang="en-US"/>
+          </a:p>
+        </p:txBody>
+      </p:sp>
     </p:spTree>
     <p:extLst>
       <p:ext uri="{BB962C8B-B14F-4D97-AF65-F5344CB8AC3E}">
@@ -22056,7 +22772,7 @@
         </p:blipFill>
         <p:spPr>
           <a:xfrm>
-            <a:off x="-186095" y="10"/>
+            <a:off x="-259837" y="239160"/>
             <a:ext cx="8325260" cy="6857990"/>
           </a:xfrm>
           <a:prstGeom prst="rect">
@@ -22168,7 +22884,7 @@
         </p:nvSpPr>
         <p:spPr>
           <a:xfrm>
-            <a:off x="5496910" y="1182116"/>
+            <a:off x="60278" y="464664"/>
             <a:ext cx="6311704" cy="1103884"/>
           </a:xfrm>
         </p:spPr>
@@ -22374,7 +23090,7 @@
         </p:nvSpPr>
         <p:spPr>
           <a:xfrm>
-            <a:off x="6453352" y="2619248"/>
+            <a:off x="6689188" y="2081467"/>
             <a:ext cx="5356024" cy="3306064"/>
           </a:xfrm>
         </p:spPr>
@@ -22427,6 +23143,66 @@
           </a:p>
         </p:txBody>
       </p:sp>
+      <p:pic>
+        <p:nvPicPr>
+          <p:cNvPr id="5" name="Picture 4" descr="A picture containing text, diagram, screenshot, plot&#10;&#10;Description automatically generated">
+            <a:extLst>
+              <a:ext uri="{FF2B5EF4-FFF2-40B4-BE49-F238E27FC236}">
+                <a16:creationId xmlns:a16="http://schemas.microsoft.com/office/drawing/2014/main" id="{01D747BC-5C07-FAC3-812D-9EC8BE66A617}"/>
+              </a:ext>
+            </a:extLst>
+          </p:cNvPr>
+          <p:cNvPicPr>
+            <a:picLocks noChangeAspect="1"/>
+          </p:cNvPicPr>
+          <p:nvPr/>
+        </p:nvPicPr>
+        <p:blipFill>
+          <a:blip r:embed="rId4"/>
+          <a:stretch>
+            <a:fillRect/>
+          </a:stretch>
+        </p:blipFill>
+        <p:spPr>
+          <a:xfrm>
+            <a:off x="401427" y="2146450"/>
+            <a:ext cx="4615944" cy="2817897"/>
+          </a:xfrm>
+          <a:prstGeom prst="rect">
+            <a:avLst/>
+          </a:prstGeom>
+        </p:spPr>
+      </p:pic>
+      <p:sp>
+        <p:nvSpPr>
+          <p:cNvPr id="6" name="Slide Number Placeholder 5">
+            <a:extLst>
+              <a:ext uri="{FF2B5EF4-FFF2-40B4-BE49-F238E27FC236}">
+                <a16:creationId xmlns:a16="http://schemas.microsoft.com/office/drawing/2014/main" id="{B9F77DCF-E041-900D-790C-1B7B11D915D1}"/>
+              </a:ext>
+            </a:extLst>
+          </p:cNvPr>
+          <p:cNvSpPr>
+            <a:spLocks noGrp="1"/>
+          </p:cNvSpPr>
+          <p:nvPr>
+            <p:ph type="sldNum" sz="quarter" idx="12"/>
+          </p:nvPr>
+        </p:nvSpPr>
+        <p:spPr/>
+        <p:txBody>
+          <a:bodyPr/>
+          <a:lstStyle/>
+          <a:p>
+            <a:fld id="{4F34D30B-D7E0-FB45-A278-C7D854F08543}" type="slidenum">
+              <a:rPr lang="en-US" smtClean="0"/>
+              <a:pPr/>
+              <a:t>9</a:t>
+            </a:fld>
+            <a:endParaRPr lang="en-US"/>
+          </a:p>
+        </p:txBody>
+      </p:sp>
     </p:spTree>
     <p:extLst>
       <p:ext uri="{BB962C8B-B14F-4D97-AF65-F5344CB8AC3E}">
@@ -22437,6 +23213,504 @@
   <p:clrMapOvr>
     <a:masterClrMapping/>
   </p:clrMapOvr>
+  <p:timing>
+    <p:tnLst>
+      <p:par>
+        <p:cTn id="1" dur="indefinite" restart="never" nodeType="tmRoot">
+          <p:childTnLst>
+            <p:seq concurrent="1" nextAc="seek">
+              <p:cTn id="2" dur="indefinite" nodeType="mainSeq">
+                <p:childTnLst>
+                  <p:par>
+                    <p:cTn id="3" fill="hold">
+                      <p:stCondLst>
+                        <p:cond delay="indefinite"/>
+                      </p:stCondLst>
+                      <p:childTnLst>
+                        <p:par>
+                          <p:cTn id="4" fill="hold">
+                            <p:stCondLst>
+                              <p:cond delay="0"/>
+                            </p:stCondLst>
+                            <p:childTnLst>
+                              <p:par>
+                                <p:cTn id="5" presetID="1" presetClass="entr" presetSubtype="0" fill="hold" grpId="0" nodeType="clickEffect">
+                                  <p:stCondLst>
+                                    <p:cond delay="0"/>
+                                  </p:stCondLst>
+                                  <p:childTnLst>
+                                    <p:set>
+                                      <p:cBhvr>
+                                        <p:cTn id="6" dur="1" fill="hold">
+                                          <p:stCondLst>
+                                            <p:cond delay="0"/>
+                                          </p:stCondLst>
+                                        </p:cTn>
+                                        <p:tgtEl>
+                                          <p:spTgt spid="2"/>
+                                        </p:tgtEl>
+                                        <p:attrNameLst>
+                                          <p:attrName>style.visibility</p:attrName>
+                                        </p:attrNameLst>
+                                      </p:cBhvr>
+                                      <p:to>
+                                        <p:strVal val="visible"/>
+                                      </p:to>
+                                    </p:set>
+                                  </p:childTnLst>
+                                </p:cTn>
+                              </p:par>
+                            </p:childTnLst>
+                          </p:cTn>
+                        </p:par>
+                      </p:childTnLst>
+                    </p:cTn>
+                  </p:par>
+                  <p:par>
+                    <p:cTn id="7" fill="hold">
+                      <p:stCondLst>
+                        <p:cond delay="indefinite"/>
+                      </p:stCondLst>
+                      <p:childTnLst>
+                        <p:par>
+                          <p:cTn id="8" fill="hold">
+                            <p:stCondLst>
+                              <p:cond delay="0"/>
+                            </p:stCondLst>
+                            <p:childTnLst>
+                              <p:par>
+                                <p:cTn id="9" presetID="10" presetClass="entr" presetSubtype="0" fill="hold" grpId="0" nodeType="clickEffect">
+                                  <p:stCondLst>
+                                    <p:cond delay="0"/>
+                                  </p:stCondLst>
+                                  <p:childTnLst>
+                                    <p:set>
+                                      <p:cBhvr>
+                                        <p:cTn id="10" dur="1" fill="hold">
+                                          <p:stCondLst>
+                                            <p:cond delay="0"/>
+                                          </p:stCondLst>
+                                        </p:cTn>
+                                        <p:tgtEl>
+                                          <p:spTgt spid="3">
+                                            <p:txEl>
+                                              <p:pRg st="0" end="0"/>
+                                            </p:txEl>
+                                          </p:spTgt>
+                                        </p:tgtEl>
+                                        <p:attrNameLst>
+                                          <p:attrName>style.visibility</p:attrName>
+                                        </p:attrNameLst>
+                                      </p:cBhvr>
+                                      <p:to>
+                                        <p:strVal val="visible"/>
+                                      </p:to>
+                                    </p:set>
+                                    <p:animEffect transition="in" filter="fade">
+                                      <p:cBhvr>
+                                        <p:cTn id="11" dur="500"/>
+                                        <p:tgtEl>
+                                          <p:spTgt spid="3">
+                                            <p:txEl>
+                                              <p:pRg st="0" end="0"/>
+                                            </p:txEl>
+                                          </p:spTgt>
+                                        </p:tgtEl>
+                                      </p:cBhvr>
+                                    </p:animEffect>
+                                  </p:childTnLst>
+                                </p:cTn>
+                              </p:par>
+                            </p:childTnLst>
+                          </p:cTn>
+                        </p:par>
+                      </p:childTnLst>
+                    </p:cTn>
+                  </p:par>
+                  <p:par>
+                    <p:cTn id="12" fill="hold">
+                      <p:stCondLst>
+                        <p:cond delay="indefinite"/>
+                      </p:stCondLst>
+                      <p:childTnLst>
+                        <p:par>
+                          <p:cTn id="13" fill="hold">
+                            <p:stCondLst>
+                              <p:cond delay="0"/>
+                            </p:stCondLst>
+                            <p:childTnLst>
+                              <p:par>
+                                <p:cTn id="14" presetID="10" presetClass="entr" presetSubtype="0" fill="hold" grpId="0" nodeType="clickEffect">
+                                  <p:stCondLst>
+                                    <p:cond delay="0"/>
+                                  </p:stCondLst>
+                                  <p:childTnLst>
+                                    <p:set>
+                                      <p:cBhvr>
+                                        <p:cTn id="15" dur="1" fill="hold">
+                                          <p:stCondLst>
+                                            <p:cond delay="0"/>
+                                          </p:stCondLst>
+                                        </p:cTn>
+                                        <p:tgtEl>
+                                          <p:spTgt spid="3">
+                                            <p:txEl>
+                                              <p:pRg st="1" end="1"/>
+                                            </p:txEl>
+                                          </p:spTgt>
+                                        </p:tgtEl>
+                                        <p:attrNameLst>
+                                          <p:attrName>style.visibility</p:attrName>
+                                        </p:attrNameLst>
+                                      </p:cBhvr>
+                                      <p:to>
+                                        <p:strVal val="visible"/>
+                                      </p:to>
+                                    </p:set>
+                                    <p:animEffect transition="in" filter="fade">
+                                      <p:cBhvr>
+                                        <p:cTn id="16" dur="500"/>
+                                        <p:tgtEl>
+                                          <p:spTgt spid="3">
+                                            <p:txEl>
+                                              <p:pRg st="1" end="1"/>
+                                            </p:txEl>
+                                          </p:spTgt>
+                                        </p:tgtEl>
+                                      </p:cBhvr>
+                                    </p:animEffect>
+                                  </p:childTnLst>
+                                </p:cTn>
+                              </p:par>
+                            </p:childTnLst>
+                          </p:cTn>
+                        </p:par>
+                      </p:childTnLst>
+                    </p:cTn>
+                  </p:par>
+                  <p:par>
+                    <p:cTn id="17" fill="hold">
+                      <p:stCondLst>
+                        <p:cond delay="indefinite"/>
+                      </p:stCondLst>
+                      <p:childTnLst>
+                        <p:par>
+                          <p:cTn id="18" fill="hold">
+                            <p:stCondLst>
+                              <p:cond delay="0"/>
+                            </p:stCondLst>
+                            <p:childTnLst>
+                              <p:par>
+                                <p:cTn id="19" presetID="10" presetClass="entr" presetSubtype="0" fill="hold" grpId="0" nodeType="clickEffect">
+                                  <p:stCondLst>
+                                    <p:cond delay="0"/>
+                                  </p:stCondLst>
+                                  <p:childTnLst>
+                                    <p:set>
+                                      <p:cBhvr>
+                                        <p:cTn id="20" dur="1" fill="hold">
+                                          <p:stCondLst>
+                                            <p:cond delay="0"/>
+                                          </p:stCondLst>
+                                        </p:cTn>
+                                        <p:tgtEl>
+                                          <p:spTgt spid="3">
+                                            <p:txEl>
+                                              <p:pRg st="2" end="2"/>
+                                            </p:txEl>
+                                          </p:spTgt>
+                                        </p:tgtEl>
+                                        <p:attrNameLst>
+                                          <p:attrName>style.visibility</p:attrName>
+                                        </p:attrNameLst>
+                                      </p:cBhvr>
+                                      <p:to>
+                                        <p:strVal val="visible"/>
+                                      </p:to>
+                                    </p:set>
+                                    <p:animEffect transition="in" filter="fade">
+                                      <p:cBhvr>
+                                        <p:cTn id="21" dur="500"/>
+                                        <p:tgtEl>
+                                          <p:spTgt spid="3">
+                                            <p:txEl>
+                                              <p:pRg st="2" end="2"/>
+                                            </p:txEl>
+                                          </p:spTgt>
+                                        </p:tgtEl>
+                                      </p:cBhvr>
+                                    </p:animEffect>
+                                  </p:childTnLst>
+                                </p:cTn>
+                              </p:par>
+                            </p:childTnLst>
+                          </p:cTn>
+                        </p:par>
+                      </p:childTnLst>
+                    </p:cTn>
+                  </p:par>
+                  <p:par>
+                    <p:cTn id="22" fill="hold">
+                      <p:stCondLst>
+                        <p:cond delay="indefinite"/>
+                      </p:stCondLst>
+                      <p:childTnLst>
+                        <p:par>
+                          <p:cTn id="23" fill="hold">
+                            <p:stCondLst>
+                              <p:cond delay="0"/>
+                            </p:stCondLst>
+                            <p:childTnLst>
+                              <p:par>
+                                <p:cTn id="24" presetID="10" presetClass="entr" presetSubtype="0" fill="hold" grpId="0" nodeType="clickEffect">
+                                  <p:stCondLst>
+                                    <p:cond delay="0"/>
+                                  </p:stCondLst>
+                                  <p:childTnLst>
+                                    <p:set>
+                                      <p:cBhvr>
+                                        <p:cTn id="25" dur="1" fill="hold">
+                                          <p:stCondLst>
+                                            <p:cond delay="0"/>
+                                          </p:stCondLst>
+                                        </p:cTn>
+                                        <p:tgtEl>
+                                          <p:spTgt spid="3">
+                                            <p:txEl>
+                                              <p:pRg st="3" end="3"/>
+                                            </p:txEl>
+                                          </p:spTgt>
+                                        </p:tgtEl>
+                                        <p:attrNameLst>
+                                          <p:attrName>style.visibility</p:attrName>
+                                        </p:attrNameLst>
+                                      </p:cBhvr>
+                                      <p:to>
+                                        <p:strVal val="visible"/>
+                                      </p:to>
+                                    </p:set>
+                                    <p:animEffect transition="in" filter="fade">
+                                      <p:cBhvr>
+                                        <p:cTn id="26" dur="500"/>
+                                        <p:tgtEl>
+                                          <p:spTgt spid="3">
+                                            <p:txEl>
+                                              <p:pRg st="3" end="3"/>
+                                            </p:txEl>
+                                          </p:spTgt>
+                                        </p:tgtEl>
+                                      </p:cBhvr>
+                                    </p:animEffect>
+                                  </p:childTnLst>
+                                </p:cTn>
+                              </p:par>
+                            </p:childTnLst>
+                          </p:cTn>
+                        </p:par>
+                      </p:childTnLst>
+                    </p:cTn>
+                  </p:par>
+                  <p:par>
+                    <p:cTn id="27" fill="hold">
+                      <p:stCondLst>
+                        <p:cond delay="indefinite"/>
+                      </p:stCondLst>
+                      <p:childTnLst>
+                        <p:par>
+                          <p:cTn id="28" fill="hold">
+                            <p:stCondLst>
+                              <p:cond delay="0"/>
+                            </p:stCondLst>
+                            <p:childTnLst>
+                              <p:par>
+                                <p:cTn id="29" presetID="10" presetClass="entr" presetSubtype="0" fill="hold" grpId="0" nodeType="clickEffect">
+                                  <p:stCondLst>
+                                    <p:cond delay="0"/>
+                                  </p:stCondLst>
+                                  <p:childTnLst>
+                                    <p:set>
+                                      <p:cBhvr>
+                                        <p:cTn id="30" dur="1" fill="hold">
+                                          <p:stCondLst>
+                                            <p:cond delay="0"/>
+                                          </p:stCondLst>
+                                        </p:cTn>
+                                        <p:tgtEl>
+                                          <p:spTgt spid="3">
+                                            <p:txEl>
+                                              <p:pRg st="4" end="4"/>
+                                            </p:txEl>
+                                          </p:spTgt>
+                                        </p:tgtEl>
+                                        <p:attrNameLst>
+                                          <p:attrName>style.visibility</p:attrName>
+                                        </p:attrNameLst>
+                                      </p:cBhvr>
+                                      <p:to>
+                                        <p:strVal val="visible"/>
+                                      </p:to>
+                                    </p:set>
+                                    <p:animEffect transition="in" filter="fade">
+                                      <p:cBhvr>
+                                        <p:cTn id="31" dur="500"/>
+                                        <p:tgtEl>
+                                          <p:spTgt spid="3">
+                                            <p:txEl>
+                                              <p:pRg st="4" end="4"/>
+                                            </p:txEl>
+                                          </p:spTgt>
+                                        </p:tgtEl>
+                                      </p:cBhvr>
+                                    </p:animEffect>
+                                  </p:childTnLst>
+                                </p:cTn>
+                              </p:par>
+                            </p:childTnLst>
+                          </p:cTn>
+                        </p:par>
+                      </p:childTnLst>
+                    </p:cTn>
+                  </p:par>
+                  <p:par>
+                    <p:cTn id="32" fill="hold">
+                      <p:stCondLst>
+                        <p:cond delay="indefinite"/>
+                      </p:stCondLst>
+                      <p:childTnLst>
+                        <p:par>
+                          <p:cTn id="33" fill="hold">
+                            <p:stCondLst>
+                              <p:cond delay="0"/>
+                            </p:stCondLst>
+                            <p:childTnLst>
+                              <p:par>
+                                <p:cTn id="34" presetID="10" presetClass="entr" presetSubtype="0" fill="hold" grpId="0" nodeType="clickEffect">
+                                  <p:stCondLst>
+                                    <p:cond delay="0"/>
+                                  </p:stCondLst>
+                                  <p:childTnLst>
+                                    <p:set>
+                                      <p:cBhvr>
+                                        <p:cTn id="35" dur="1" fill="hold">
+                                          <p:stCondLst>
+                                            <p:cond delay="0"/>
+                                          </p:stCondLst>
+                                        </p:cTn>
+                                        <p:tgtEl>
+                                          <p:spTgt spid="3">
+                                            <p:txEl>
+                                              <p:pRg st="5" end="5"/>
+                                            </p:txEl>
+                                          </p:spTgt>
+                                        </p:tgtEl>
+                                        <p:attrNameLst>
+                                          <p:attrName>style.visibility</p:attrName>
+                                        </p:attrNameLst>
+                                      </p:cBhvr>
+                                      <p:to>
+                                        <p:strVal val="visible"/>
+                                      </p:to>
+                                    </p:set>
+                                    <p:animEffect transition="in" filter="fade">
+                                      <p:cBhvr>
+                                        <p:cTn id="36" dur="500"/>
+                                        <p:tgtEl>
+                                          <p:spTgt spid="3">
+                                            <p:txEl>
+                                              <p:pRg st="5" end="5"/>
+                                            </p:txEl>
+                                          </p:spTgt>
+                                        </p:tgtEl>
+                                      </p:cBhvr>
+                                    </p:animEffect>
+                                  </p:childTnLst>
+                                </p:cTn>
+                              </p:par>
+                            </p:childTnLst>
+                          </p:cTn>
+                        </p:par>
+                      </p:childTnLst>
+                    </p:cTn>
+                  </p:par>
+                  <p:par>
+                    <p:cTn id="37" fill="hold">
+                      <p:stCondLst>
+                        <p:cond delay="indefinite"/>
+                      </p:stCondLst>
+                      <p:childTnLst>
+                        <p:par>
+                          <p:cTn id="38" fill="hold">
+                            <p:stCondLst>
+                              <p:cond delay="0"/>
+                            </p:stCondLst>
+                            <p:childTnLst>
+                              <p:par>
+                                <p:cTn id="39" presetID="14" presetClass="entr" presetSubtype="10" fill="hold" nodeType="clickEffect">
+                                  <p:stCondLst>
+                                    <p:cond delay="0"/>
+                                  </p:stCondLst>
+                                  <p:childTnLst>
+                                    <p:set>
+                                      <p:cBhvr>
+                                        <p:cTn id="40" dur="1" fill="hold">
+                                          <p:stCondLst>
+                                            <p:cond delay="0"/>
+                                          </p:stCondLst>
+                                        </p:cTn>
+                                        <p:tgtEl>
+                                          <p:spTgt spid="5"/>
+                                        </p:tgtEl>
+                                        <p:attrNameLst>
+                                          <p:attrName>style.visibility</p:attrName>
+                                        </p:attrNameLst>
+                                      </p:cBhvr>
+                                      <p:to>
+                                        <p:strVal val="visible"/>
+                                      </p:to>
+                                    </p:set>
+                                    <p:animEffect transition="in" filter="randombar(horizontal)">
+                                      <p:cBhvr>
+                                        <p:cTn id="41" dur="500"/>
+                                        <p:tgtEl>
+                                          <p:spTgt spid="5"/>
+                                        </p:tgtEl>
+                                      </p:cBhvr>
+                                    </p:animEffect>
+                                  </p:childTnLst>
+                                </p:cTn>
+                              </p:par>
+                            </p:childTnLst>
+                          </p:cTn>
+                        </p:par>
+                      </p:childTnLst>
+                    </p:cTn>
+                  </p:par>
+                </p:childTnLst>
+              </p:cTn>
+              <p:prevCondLst>
+                <p:cond evt="onPrev" delay="0">
+                  <p:tgtEl>
+                    <p:sldTgt/>
+                  </p:tgtEl>
+                </p:cond>
+              </p:prevCondLst>
+              <p:nextCondLst>
+                <p:cond evt="onNext" delay="0">
+                  <p:tgtEl>
+                    <p:sldTgt/>
+                  </p:tgtEl>
+                </p:cond>
+              </p:nextCondLst>
+            </p:seq>
+          </p:childTnLst>
+        </p:cTn>
+      </p:par>
+    </p:tnLst>
+    <p:bldLst>
+      <p:bldP spid="2" grpId="0"/>
+      <p:bldP spid="3" grpId="0" build="p"/>
+    </p:bldLst>
+  </p:timing>
   <p:extLst>
     <p:ext uri="{6950BFC3-D8DA-4A85-94F7-54DA5524770B}">
       <p188:commentRel xmlns:p188="http://schemas.microsoft.com/office/powerpoint/2018/8/main" r:id="rId2"/>
@@ -22738,4 +24012,299 @@
     </a:ext>
   </a:extLst>
 </a:theme>
+</file>
+
+<file path=ppt/theme/theme2.xml><?xml version="1.0" encoding="utf-8"?>
+<a:theme xmlns:a="http://schemas.openxmlformats.org/drawingml/2006/main" name="Office Theme">
+  <a:themeElements>
+    <a:clrScheme name="Office">
+      <a:dk1>
+        <a:sysClr val="windowText" lastClr="000000"/>
+      </a:dk1>
+      <a:lt1>
+        <a:sysClr val="window" lastClr="FFFFFF"/>
+      </a:lt1>
+      <a:dk2>
+        <a:srgbClr val="44546A"/>
+      </a:dk2>
+      <a:lt2>
+        <a:srgbClr val="E7E6E6"/>
+      </a:lt2>
+      <a:accent1>
+        <a:srgbClr val="4472C4"/>
+      </a:accent1>
+      <a:accent2>
+        <a:srgbClr val="ED7D31"/>
+      </a:accent2>
+      <a:accent3>
+        <a:srgbClr val="A5A5A5"/>
+      </a:accent3>
+      <a:accent4>
+        <a:srgbClr val="FFC000"/>
+      </a:accent4>
+      <a:accent5>
+        <a:srgbClr val="5B9BD5"/>
+      </a:accent5>
+      <a:accent6>
+        <a:srgbClr val="70AD47"/>
+      </a:accent6>
+      <a:hlink>
+        <a:srgbClr val="0563C1"/>
+      </a:hlink>
+      <a:folHlink>
+        <a:srgbClr val="954F72"/>
+      </a:folHlink>
+    </a:clrScheme>
+    <a:fontScheme name="Office">
+      <a:majorFont>
+        <a:latin typeface="Calibri Light" panose="020F0302020204030204"/>
+        <a:ea typeface=""/>
+        <a:cs typeface=""/>
+        <a:font script="Jpan" typeface="游ゴシック Light"/>
+        <a:font script="Hang" typeface="맑은 고딕"/>
+        <a:font script="Hans" typeface="等线 Light"/>
+        <a:font script="Hant" typeface="新細明體"/>
+        <a:font script="Arab" typeface="Times New Roman"/>
+        <a:font script="Hebr" typeface="Times New Roman"/>
+        <a:font script="Thai" typeface="Angsana New"/>
+        <a:font script="Ethi" typeface="Nyala"/>
+        <a:font script="Beng" typeface="Vrinda"/>
+        <a:font script="Gujr" typeface="Shruti"/>
+        <a:font script="Khmr" typeface="MoolBoran"/>
+        <a:font script="Knda" typeface="Tunga"/>
+        <a:font script="Guru" typeface="Raavi"/>
+        <a:font script="Cans" typeface="Euphemia"/>
+        <a:font script="Cher" typeface="Plantagenet Cherokee"/>
+        <a:font script="Yiii" typeface="Microsoft Yi Baiti"/>
+        <a:font script="Tibt" typeface="Microsoft Himalaya"/>
+        <a:font script="Thaa" typeface="MV Boli"/>
+        <a:font script="Deva" typeface="Mangal"/>
+        <a:font script="Telu" typeface="Gautami"/>
+        <a:font script="Taml" typeface="Latha"/>
+        <a:font script="Syrc" typeface="Estrangelo Edessa"/>
+        <a:font script="Orya" typeface="Kalinga"/>
+        <a:font script="Mlym" typeface="Kartika"/>
+        <a:font script="Laoo" typeface="DokChampa"/>
+        <a:font script="Sinh" typeface="Iskoola Pota"/>
+        <a:font script="Mong" typeface="Mongolian Baiti"/>
+        <a:font script="Viet" typeface="Times New Roman"/>
+        <a:font script="Uigh" typeface="Microsoft Uighur"/>
+        <a:font script="Geor" typeface="Sylfaen"/>
+        <a:font script="Armn" typeface="Arial"/>
+        <a:font script="Bugi" typeface="Leelawadee UI"/>
+        <a:font script="Bopo" typeface="Microsoft JhengHei"/>
+        <a:font script="Java" typeface="Javanese Text"/>
+        <a:font script="Lisu" typeface="Segoe UI"/>
+        <a:font script="Mymr" typeface="Myanmar Text"/>
+        <a:font script="Nkoo" typeface="Ebrima"/>
+        <a:font script="Olck" typeface="Nirmala UI"/>
+        <a:font script="Osma" typeface="Ebrima"/>
+        <a:font script="Phag" typeface="Phagspa"/>
+        <a:font script="Syrn" typeface="Estrangelo Edessa"/>
+        <a:font script="Syrj" typeface="Estrangelo Edessa"/>
+        <a:font script="Syre" typeface="Estrangelo Edessa"/>
+        <a:font script="Sora" typeface="Nirmala UI"/>
+        <a:font script="Tale" typeface="Microsoft Tai Le"/>
+        <a:font script="Talu" typeface="Microsoft New Tai Lue"/>
+        <a:font script="Tfng" typeface="Ebrima"/>
+      </a:majorFont>
+      <a:minorFont>
+        <a:latin typeface="Calibri" panose="020F0502020204030204"/>
+        <a:ea typeface=""/>
+        <a:cs typeface=""/>
+        <a:font script="Jpan" typeface="游ゴシック"/>
+        <a:font script="Hang" typeface="맑은 고딕"/>
+        <a:font script="Hans" typeface="等线"/>
+        <a:font script="Hant" typeface="新細明體"/>
+        <a:font script="Arab" typeface="Arial"/>
+        <a:font script="Hebr" typeface="Arial"/>
+        <a:font script="Thai" typeface="Cordia New"/>
+        <a:font script="Ethi" typeface="Nyala"/>
+        <a:font script="Beng" typeface="Vrinda"/>
+        <a:font script="Gujr" typeface="Shruti"/>
+        <a:font script="Khmr" typeface="DaunPenh"/>
+        <a:font script="Knda" typeface="Tunga"/>
+        <a:font script="Guru" typeface="Raavi"/>
+        <a:font script="Cans" typeface="Euphemia"/>
+        <a:font script="Cher" typeface="Plantagenet Cherokee"/>
+        <a:font script="Yiii" typeface="Microsoft Yi Baiti"/>
+        <a:font script="Tibt" typeface="Microsoft Himalaya"/>
+        <a:font script="Thaa" typeface="MV Boli"/>
+        <a:font script="Deva" typeface="Mangal"/>
+        <a:font script="Telu" typeface="Gautami"/>
+        <a:font script="Taml" typeface="Latha"/>
+        <a:font script="Syrc" typeface="Estrangelo Edessa"/>
+        <a:font script="Orya" typeface="Kalinga"/>
+        <a:font script="Mlym" typeface="Kartika"/>
+        <a:font script="Laoo" typeface="DokChampa"/>
+        <a:font script="Sinh" typeface="Iskoola Pota"/>
+        <a:font script="Mong" typeface="Mongolian Baiti"/>
+        <a:font script="Viet" typeface="Arial"/>
+        <a:font script="Uigh" typeface="Microsoft Uighur"/>
+        <a:font script="Geor" typeface="Sylfaen"/>
+        <a:font script="Armn" typeface="Arial"/>
+        <a:font script="Bugi" typeface="Leelawadee UI"/>
+        <a:font script="Bopo" typeface="Microsoft JhengHei"/>
+        <a:font script="Java" typeface="Javanese Text"/>
+        <a:font script="Lisu" typeface="Segoe UI"/>
+        <a:font script="Mymr" typeface="Myanmar Text"/>
+        <a:font script="Nkoo" typeface="Ebrima"/>
+        <a:font script="Olck" typeface="Nirmala UI"/>
+        <a:font script="Osma" typeface="Ebrima"/>
+        <a:font script="Phag" typeface="Phagspa"/>
+        <a:font script="Syrn" typeface="Estrangelo Edessa"/>
+        <a:font script="Syrj" typeface="Estrangelo Edessa"/>
+        <a:font script="Syre" typeface="Estrangelo Edessa"/>
+        <a:font script="Sora" typeface="Nirmala UI"/>
+        <a:font script="Tale" typeface="Microsoft Tai Le"/>
+        <a:font script="Talu" typeface="Microsoft New Tai Lue"/>
+        <a:font script="Tfng" typeface="Ebrima"/>
+      </a:minorFont>
+    </a:fontScheme>
+    <a:fmtScheme name="Office">
+      <a:fillStyleLst>
+        <a:solidFill>
+          <a:schemeClr val="phClr"/>
+        </a:solidFill>
+        <a:gradFill rotWithShape="1">
+          <a:gsLst>
+            <a:gs pos="0">
+              <a:schemeClr val="phClr">
+                <a:lumMod val="110000"/>
+                <a:satMod val="105000"/>
+                <a:tint val="67000"/>
+              </a:schemeClr>
+            </a:gs>
+            <a:gs pos="50000">
+              <a:schemeClr val="phClr">
+                <a:lumMod val="105000"/>
+                <a:satMod val="103000"/>
+                <a:tint val="73000"/>
+              </a:schemeClr>
+            </a:gs>
+            <a:gs pos="100000">
+              <a:schemeClr val="phClr">
+                <a:lumMod val="105000"/>
+                <a:satMod val="109000"/>
+                <a:tint val="81000"/>
+              </a:schemeClr>
+            </a:gs>
+          </a:gsLst>
+          <a:lin ang="5400000" scaled="0"/>
+        </a:gradFill>
+        <a:gradFill rotWithShape="1">
+          <a:gsLst>
+            <a:gs pos="0">
+              <a:schemeClr val="phClr">
+                <a:satMod val="103000"/>
+                <a:lumMod val="102000"/>
+                <a:tint val="94000"/>
+              </a:schemeClr>
+            </a:gs>
+            <a:gs pos="50000">
+              <a:schemeClr val="phClr">
+                <a:satMod val="110000"/>
+                <a:lumMod val="100000"/>
+                <a:shade val="100000"/>
+              </a:schemeClr>
+            </a:gs>
+            <a:gs pos="100000">
+              <a:schemeClr val="phClr">
+                <a:lumMod val="99000"/>
+                <a:satMod val="120000"/>
+                <a:shade val="78000"/>
+              </a:schemeClr>
+            </a:gs>
+          </a:gsLst>
+          <a:lin ang="5400000" scaled="0"/>
+        </a:gradFill>
+      </a:fillStyleLst>
+      <a:lnStyleLst>
+        <a:ln w="6350" cap="flat" cmpd="sng" algn="ctr">
+          <a:solidFill>
+            <a:schemeClr val="phClr"/>
+          </a:solidFill>
+          <a:prstDash val="solid"/>
+          <a:miter lim="800000"/>
+        </a:ln>
+        <a:ln w="12700" cap="flat" cmpd="sng" algn="ctr">
+          <a:solidFill>
+            <a:schemeClr val="phClr"/>
+          </a:solidFill>
+          <a:prstDash val="solid"/>
+          <a:miter lim="800000"/>
+        </a:ln>
+        <a:ln w="19050" cap="flat" cmpd="sng" algn="ctr">
+          <a:solidFill>
+            <a:schemeClr val="phClr"/>
+          </a:solidFill>
+          <a:prstDash val="solid"/>
+          <a:miter lim="800000"/>
+        </a:ln>
+      </a:lnStyleLst>
+      <a:effectStyleLst>
+        <a:effectStyle>
+          <a:effectLst/>
+        </a:effectStyle>
+        <a:effectStyle>
+          <a:effectLst/>
+        </a:effectStyle>
+        <a:effectStyle>
+          <a:effectLst>
+            <a:outerShdw blurRad="57150" dist="19050" dir="5400000" algn="ctr" rotWithShape="0">
+              <a:srgbClr val="000000">
+                <a:alpha val="63000"/>
+              </a:srgbClr>
+            </a:outerShdw>
+          </a:effectLst>
+        </a:effectStyle>
+      </a:effectStyleLst>
+      <a:bgFillStyleLst>
+        <a:solidFill>
+          <a:schemeClr val="phClr"/>
+        </a:solidFill>
+        <a:solidFill>
+          <a:schemeClr val="phClr">
+            <a:tint val="95000"/>
+            <a:satMod val="170000"/>
+          </a:schemeClr>
+        </a:solidFill>
+        <a:gradFill rotWithShape="1">
+          <a:gsLst>
+            <a:gs pos="0">
+              <a:schemeClr val="phClr">
+                <a:tint val="93000"/>
+                <a:satMod val="150000"/>
+                <a:shade val="98000"/>
+                <a:lumMod val="102000"/>
+              </a:schemeClr>
+            </a:gs>
+            <a:gs pos="50000">
+              <a:schemeClr val="phClr">
+                <a:tint val="98000"/>
+                <a:satMod val="130000"/>
+                <a:shade val="90000"/>
+                <a:lumMod val="103000"/>
+              </a:schemeClr>
+            </a:gs>
+            <a:gs pos="100000">
+              <a:schemeClr val="phClr">
+                <a:shade val="63000"/>
+                <a:satMod val="120000"/>
+              </a:schemeClr>
+            </a:gs>
+          </a:gsLst>
+          <a:lin ang="5400000" scaled="0"/>
+        </a:gradFill>
+      </a:bgFillStyleLst>
+    </a:fmtScheme>
+  </a:themeElements>
+  <a:objectDefaults/>
+  <a:extraClrSchemeLst/>
+  <a:extLst>
+    <a:ext uri="{05A4C25C-085E-4340-85A3-A5531E510DB2}">
+      <thm15:themeFamily xmlns:thm15="http://schemas.microsoft.com/office/thememl/2012/main" name="Office Theme" id="{62F939B6-93AF-4DB8-9C6B-D6C7DFDC589F}" vid="{4A3C46E8-61CC-4603-A589-7422A47A8E4A}"/>
+    </a:ext>
+  </a:extLst>
+</a:theme>
 </file>
</xml_diff>